<commit_message>
updated slides for better flow and fixing a few inconsistencies
</commit_message>
<xml_diff>
--- a/ClassMaterials/ArraysAndLists/Slides/Part1-JavaPrimitiveTypes.pptx
+++ b/ClassMaterials/ArraysAndLists/Slides/Part1-JavaPrimitiveTypes.pptx
@@ -3175,7 +3175,7 @@
           </a:ln>
           <a:extLst>
             <a:ext uri="{C572A759-6A51-4108-AA02-DFA0A04FC94B}">
-              <ma14:wrappingTextBoxFlag xmlns="" xmlns:ma14="http://schemas.microsoft.com/office/mac/drawingml/2011/main" val="1"/>
+              <ma14:wrappingTextBoxFlag xmlns:ma14="http://schemas.microsoft.com/office/mac/drawingml/2011/main" xmlns="" val="1"/>
             </a:ext>
           </a:extLst>
         </p:spPr>
@@ -3218,7 +3218,7 @@
           </a:ln>
           <a:extLst>
             <a:ext uri="{C572A759-6A51-4108-AA02-DFA0A04FC94B}">
-              <ma14:wrappingTextBoxFlag xmlns="" xmlns:ma14="http://schemas.microsoft.com/office/mac/drawingml/2011/main" val="1"/>
+              <ma14:wrappingTextBoxFlag xmlns:ma14="http://schemas.microsoft.com/office/mac/drawingml/2011/main" xmlns="" val="1"/>
             </a:ext>
           </a:extLst>
         </p:spPr>
@@ -3684,7 +3684,7 @@
           </a:ln>
           <a:extLst>
             <a:ext uri="{C572A759-6A51-4108-AA02-DFA0A04FC94B}">
-              <ma14:wrappingTextBoxFlag xmlns="" xmlns:ma14="http://schemas.microsoft.com/office/mac/drawingml/2011/main" val="1"/>
+              <ma14:wrappingTextBoxFlag xmlns:ma14="http://schemas.microsoft.com/office/mac/drawingml/2011/main" xmlns="" val="1"/>
             </a:ext>
           </a:extLst>
         </p:spPr>
@@ -4845,7 +4845,7 @@
                 <a:latin typeface="Times New Roman" panose="02020603050405020304" pitchFamily="18" charset="0"/>
                 <a:cs typeface="Times New Roman" panose="02020603050405020304" pitchFamily="18" charset="0"/>
               </a:rPr>
-              <a:t>Line #6 declares the a1 (an object instance) to be an </a:t>
+              <a:t>Line #5 declares the a1 (an object instance) to be an </a:t>
             </a:r>
             <a:r>
               <a:rPr lang="en-US" sz="2000" dirty="0" err="1">
@@ -5458,7 +5458,7 @@
           <p:nvPr/>
         </p:nvPicPr>
         <p:blipFill>
-          <a:blip r:embed="rId3">
+          <a:blip r:embed="rId3" cstate="print">
             <a:extLst>
               <a:ext uri="{28A0092B-C50C-407E-A947-70E740481C1C}">
                 <a14:useLocalDpi xmlns:a14="http://schemas.microsoft.com/office/drawing/2010/main" val="0"/>
@@ -5763,7 +5763,7 @@
           <p:nvPr/>
         </p:nvPicPr>
         <p:blipFill>
-          <a:blip r:embed="rId3">
+          <a:blip r:embed="rId3" cstate="print">
             <a:extLst>
               <a:ext uri="{28A0092B-C50C-407E-A947-70E740481C1C}">
                 <a14:useLocalDpi xmlns:a14="http://schemas.microsoft.com/office/drawing/2010/main" val="0"/>
@@ -6640,7 +6640,7 @@
           <p:nvPr/>
         </p:nvPicPr>
         <p:blipFill>
-          <a:blip r:embed="rId3">
+          <a:blip r:embed="rId3" cstate="print">
             <a:extLst>
               <a:ext uri="{28A0092B-C50C-407E-A947-70E740481C1C}">
                 <a14:useLocalDpi xmlns:a14="http://schemas.microsoft.com/office/drawing/2010/main" val="0"/>
@@ -7491,7 +7491,7 @@
           <p:nvPr/>
         </p:nvPicPr>
         <p:blipFill>
-          <a:blip r:embed="rId3">
+          <a:blip r:embed="rId3" cstate="print">
             <a:extLst>
               <a:ext uri="{28A0092B-C50C-407E-A947-70E740481C1C}">
                 <a14:useLocalDpi xmlns:a14="http://schemas.microsoft.com/office/drawing/2010/main" val="0"/>
@@ -8257,7 +8257,7 @@
           <p:nvPr/>
         </p:nvPicPr>
         <p:blipFill>
-          <a:blip r:embed="rId3">
+          <a:blip r:embed="rId3" cstate="print">
             <a:extLst>
               <a:ext uri="{28A0092B-C50C-407E-A947-70E740481C1C}">
                 <a14:useLocalDpi xmlns:a14="http://schemas.microsoft.com/office/drawing/2010/main" val="0"/>

</xml_diff>